<commit_message>
Changed image to image slides
</commit_message>
<xml_diff>
--- a/Presentation1.pptx
+++ b/Presentation1.pptx
@@ -6,6 +6,11 @@
   </p:sldMasterIdLst>
   <p:sldIdLst>
     <p:sldId id="256" r:id="rId2"/>
+    <p:sldId id="257" r:id="rId3"/>
+    <p:sldId id="259" r:id="rId4"/>
+    <p:sldId id="260" r:id="rId5"/>
+    <p:sldId id="261" r:id="rId6"/>
+    <p:sldId id="262" r:id="rId7"/>
   </p:sldIdLst>
   <p:sldSz cx="12192000" cy="6858000"/>
   <p:notesSz cx="6858000" cy="9144000"/>
@@ -104,6 +109,11 @@
       </a:defRPr>
     </a:lvl9pPr>
   </p:defaultTextStyle>
+  <p:extLst>
+    <p:ext uri="{EFAFB233-063F-42B5-8137-9DF3F51BA10A}">
+      <p15:sldGuideLst xmlns:p15="http://schemas.microsoft.com/office/powerpoint/2012/main"/>
+    </p:ext>
+  </p:extLst>
 </p:presentation>
 </file>
 
@@ -238,7 +248,7 @@
           <a:p>
             <a:fld id="{83DE4697-5D3E-4895-B8E5-E807FC22AD36}" type="datetimeFigureOut">
               <a:rPr lang="en-US" smtClean="0"/>
-              <a:t>1/31/2018</a:t>
+              <a:t>2/2/2018</a:t>
             </a:fld>
             <a:endParaRPr lang="en-US"/>
           </a:p>
@@ -408,7 +418,7 @@
           <a:p>
             <a:fld id="{83DE4697-5D3E-4895-B8E5-E807FC22AD36}" type="datetimeFigureOut">
               <a:rPr lang="en-US" smtClean="0"/>
-              <a:t>1/31/2018</a:t>
+              <a:t>2/2/2018</a:t>
             </a:fld>
             <a:endParaRPr lang="en-US"/>
           </a:p>
@@ -588,7 +598,7 @@
           <a:p>
             <a:fld id="{83DE4697-5D3E-4895-B8E5-E807FC22AD36}" type="datetimeFigureOut">
               <a:rPr lang="en-US" smtClean="0"/>
-              <a:t>1/31/2018</a:t>
+              <a:t>2/2/2018</a:t>
             </a:fld>
             <a:endParaRPr lang="en-US"/>
           </a:p>
@@ -758,7 +768,7 @@
           <a:p>
             <a:fld id="{83DE4697-5D3E-4895-B8E5-E807FC22AD36}" type="datetimeFigureOut">
               <a:rPr lang="en-US" smtClean="0"/>
-              <a:t>1/31/2018</a:t>
+              <a:t>2/2/2018</a:t>
             </a:fld>
             <a:endParaRPr lang="en-US"/>
           </a:p>
@@ -1004,7 +1014,7 @@
           <a:p>
             <a:fld id="{83DE4697-5D3E-4895-B8E5-E807FC22AD36}" type="datetimeFigureOut">
               <a:rPr lang="en-US" smtClean="0"/>
-              <a:t>1/31/2018</a:t>
+              <a:t>2/2/2018</a:t>
             </a:fld>
             <a:endParaRPr lang="en-US"/>
           </a:p>
@@ -1236,7 +1246,7 @@
           <a:p>
             <a:fld id="{83DE4697-5D3E-4895-B8E5-E807FC22AD36}" type="datetimeFigureOut">
               <a:rPr lang="en-US" smtClean="0"/>
-              <a:t>1/31/2018</a:t>
+              <a:t>2/2/2018</a:t>
             </a:fld>
             <a:endParaRPr lang="en-US"/>
           </a:p>
@@ -1603,7 +1613,7 @@
           <a:p>
             <a:fld id="{83DE4697-5D3E-4895-B8E5-E807FC22AD36}" type="datetimeFigureOut">
               <a:rPr lang="en-US" smtClean="0"/>
-              <a:t>1/31/2018</a:t>
+              <a:t>2/2/2018</a:t>
             </a:fld>
             <a:endParaRPr lang="en-US"/>
           </a:p>
@@ -1721,7 +1731,7 @@
           <a:p>
             <a:fld id="{83DE4697-5D3E-4895-B8E5-E807FC22AD36}" type="datetimeFigureOut">
               <a:rPr lang="en-US" smtClean="0"/>
-              <a:t>1/31/2018</a:t>
+              <a:t>2/2/2018</a:t>
             </a:fld>
             <a:endParaRPr lang="en-US"/>
           </a:p>
@@ -1816,7 +1826,7 @@
           <a:p>
             <a:fld id="{83DE4697-5D3E-4895-B8E5-E807FC22AD36}" type="datetimeFigureOut">
               <a:rPr lang="en-US" smtClean="0"/>
-              <a:t>1/31/2018</a:t>
+              <a:t>2/2/2018</a:t>
             </a:fld>
             <a:endParaRPr lang="en-US"/>
           </a:p>
@@ -2093,7 +2103,7 @@
           <a:p>
             <a:fld id="{83DE4697-5D3E-4895-B8E5-E807FC22AD36}" type="datetimeFigureOut">
               <a:rPr lang="en-US" smtClean="0"/>
-              <a:t>1/31/2018</a:t>
+              <a:t>2/2/2018</a:t>
             </a:fld>
             <a:endParaRPr lang="en-US"/>
           </a:p>
@@ -2346,7 +2356,7 @@
           <a:p>
             <a:fld id="{83DE4697-5D3E-4895-B8E5-E807FC22AD36}" type="datetimeFigureOut">
               <a:rPr lang="en-US" smtClean="0"/>
-              <a:t>1/31/2018</a:t>
+              <a:t>2/2/2018</a:t>
             </a:fld>
             <a:endParaRPr lang="en-US"/>
           </a:p>
@@ -2559,7 +2569,7 @@
           <a:p>
             <a:fld id="{83DE4697-5D3E-4895-B8E5-E807FC22AD36}" type="datetimeFigureOut">
               <a:rPr lang="en-US" smtClean="0"/>
-              <a:t>1/31/2018</a:t>
+              <a:t>2/2/2018</a:t>
             </a:fld>
             <a:endParaRPr lang="en-US"/>
           </a:p>
@@ -3169,6 +3179,735 @@
 </p:sld>
 </file>
 
+<file path=ppt/slides/slide2.xml><?xml version="1.0" encoding="utf-8"?>
+<p:sld xmlns:a="http://schemas.openxmlformats.org/drawingml/2006/main" xmlns:r="http://schemas.openxmlformats.org/officeDocument/2006/relationships" xmlns:p="http://schemas.openxmlformats.org/presentationml/2006/main">
+  <p:cSld>
+    <p:spTree>
+      <p:nvGrpSpPr>
+        <p:cNvPr id="1" name=""/>
+        <p:cNvGrpSpPr/>
+        <p:nvPr/>
+      </p:nvGrpSpPr>
+      <p:grpSpPr>
+        <a:xfrm>
+          <a:off x="0" y="0"/>
+          <a:ext cx="0" cy="0"/>
+          <a:chOff x="0" y="0"/>
+          <a:chExt cx="0" cy="0"/>
+        </a:xfrm>
+      </p:grpSpPr>
+      <p:grpSp>
+        <p:nvGrpSpPr>
+          <p:cNvPr id="6" name="그룹 5"/>
+          <p:cNvGrpSpPr/>
+          <p:nvPr/>
+        </p:nvGrpSpPr>
+        <p:grpSpPr>
+          <a:xfrm>
+            <a:off x="1959662" y="1612557"/>
+            <a:ext cx="4762500" cy="3333750"/>
+            <a:chOff x="1959662" y="1612557"/>
+            <a:chExt cx="4762500" cy="3333750"/>
+          </a:xfrm>
+        </p:grpSpPr>
+        <p:pic>
+          <p:nvPicPr>
+            <p:cNvPr id="1026" name="Picture 2" descr="Image result for monitor png"/>
+            <p:cNvPicPr>
+              <a:picLocks noChangeAspect="1" noChangeArrowheads="1"/>
+            </p:cNvPicPr>
+            <p:nvPr/>
+          </p:nvPicPr>
+          <p:blipFill>
+            <a:blip r:embed="rId2">
+              <a:extLst>
+                <a:ext uri="{28A0092B-C50C-407E-A947-70E740481C1C}">
+                  <a14:useLocalDpi xmlns:a14="http://schemas.microsoft.com/office/drawing/2010/main" val="0"/>
+                </a:ext>
+              </a:extLst>
+            </a:blip>
+            <a:srcRect/>
+            <a:stretch>
+              <a:fillRect/>
+            </a:stretch>
+          </p:blipFill>
+          <p:spPr bwMode="auto">
+            <a:xfrm>
+              <a:off x="1959662" y="1612557"/>
+              <a:ext cx="4762500" cy="3333750"/>
+            </a:xfrm>
+            <a:prstGeom prst="rect">
+              <a:avLst/>
+            </a:prstGeom>
+            <a:noFill/>
+            <a:extLst>
+              <a:ext uri="{909E8E84-426E-40DD-AFC4-6F175D3DCCD1}">
+                <a14:hiddenFill xmlns:a14="http://schemas.microsoft.com/office/drawing/2010/main">
+                  <a:solidFill>
+                    <a:srgbClr val="FFFFFF"/>
+                  </a:solidFill>
+                </a14:hiddenFill>
+              </a:ext>
+            </a:extLst>
+          </p:spPr>
+        </p:pic>
+        <p:pic>
+          <p:nvPicPr>
+            <p:cNvPr id="2" name="그림 1"/>
+            <p:cNvPicPr>
+              <a:picLocks noChangeAspect="1"/>
+            </p:cNvPicPr>
+            <p:nvPr/>
+          </p:nvPicPr>
+          <p:blipFill>
+            <a:blip r:embed="rId3">
+              <a:extLst>
+                <a:ext uri="{28A0092B-C50C-407E-A947-70E740481C1C}">
+                  <a14:useLocalDpi xmlns:a14="http://schemas.microsoft.com/office/drawing/2010/main" val="0"/>
+                </a:ext>
+              </a:extLst>
+            </a:blip>
+            <a:stretch>
+              <a:fillRect/>
+            </a:stretch>
+          </p:blipFill>
+          <p:spPr>
+            <a:xfrm>
+              <a:off x="2160501" y="1829571"/>
+              <a:ext cx="4372104" cy="2892291"/>
+            </a:xfrm>
+            <a:prstGeom prst="rect">
+              <a:avLst/>
+            </a:prstGeom>
+          </p:spPr>
+        </p:pic>
+      </p:grpSp>
+    </p:spTree>
+    <p:extLst>
+      <p:ext uri="{BB962C8B-B14F-4D97-AF65-F5344CB8AC3E}">
+        <p14:creationId xmlns:p14="http://schemas.microsoft.com/office/powerpoint/2010/main" val="1407237694"/>
+      </p:ext>
+    </p:extLst>
+  </p:cSld>
+  <p:clrMapOvr>
+    <a:masterClrMapping/>
+  </p:clrMapOvr>
+</p:sld>
+</file>
+
+<file path=ppt/slides/slide3.xml><?xml version="1.0" encoding="utf-8"?>
+<p:sld xmlns:a="http://schemas.openxmlformats.org/drawingml/2006/main" xmlns:r="http://schemas.openxmlformats.org/officeDocument/2006/relationships" xmlns:p="http://schemas.openxmlformats.org/presentationml/2006/main">
+  <p:cSld>
+    <p:spTree>
+      <p:nvGrpSpPr>
+        <p:cNvPr id="1" name=""/>
+        <p:cNvGrpSpPr/>
+        <p:nvPr/>
+      </p:nvGrpSpPr>
+      <p:grpSpPr>
+        <a:xfrm>
+          <a:off x="0" y="0"/>
+          <a:ext cx="0" cy="0"/>
+          <a:chOff x="0" y="0"/>
+          <a:chExt cx="0" cy="0"/>
+        </a:xfrm>
+      </p:grpSpPr>
+      <p:pic>
+        <p:nvPicPr>
+          <p:cNvPr id="1026" name="Picture 2" descr="Image result for monitor png"/>
+          <p:cNvPicPr>
+            <a:picLocks noChangeAspect="1" noChangeArrowheads="1"/>
+          </p:cNvPicPr>
+          <p:nvPr/>
+        </p:nvPicPr>
+        <p:blipFill>
+          <a:blip r:embed="rId2">
+            <a:extLst>
+              <a:ext uri="{28A0092B-C50C-407E-A947-70E740481C1C}">
+                <a14:useLocalDpi xmlns:a14="http://schemas.microsoft.com/office/drawing/2010/main" val="0"/>
+              </a:ext>
+            </a:extLst>
+          </a:blip>
+          <a:srcRect/>
+          <a:stretch>
+            <a:fillRect/>
+          </a:stretch>
+        </p:blipFill>
+        <p:spPr bwMode="auto">
+          <a:xfrm>
+            <a:off x="1959662" y="1612557"/>
+            <a:ext cx="4762500" cy="3333750"/>
+          </a:xfrm>
+          <a:prstGeom prst="rect">
+            <a:avLst/>
+          </a:prstGeom>
+          <a:noFill/>
+          <a:extLst>
+            <a:ext uri="{909E8E84-426E-40DD-AFC4-6F175D3DCCD1}">
+              <a14:hiddenFill xmlns:a14="http://schemas.microsoft.com/office/drawing/2010/main">
+                <a:solidFill>
+                  <a:srgbClr val="FFFFFF"/>
+                </a:solidFill>
+              </a14:hiddenFill>
+            </a:ext>
+          </a:extLst>
+        </p:spPr>
+      </p:pic>
+      <p:pic>
+        <p:nvPicPr>
+          <p:cNvPr id="7" name="그림 6"/>
+          <p:cNvPicPr>
+            <a:picLocks noChangeAspect="1"/>
+          </p:cNvPicPr>
+          <p:nvPr/>
+        </p:nvPicPr>
+        <p:blipFill>
+          <a:blip r:embed="rId3" cstate="print">
+            <a:extLst>
+              <a:ext uri="{28A0092B-C50C-407E-A947-70E740481C1C}">
+                <a14:useLocalDpi xmlns:a14="http://schemas.microsoft.com/office/drawing/2010/main" val="0"/>
+              </a:ext>
+            </a:extLst>
+          </a:blip>
+          <a:stretch>
+            <a:fillRect/>
+          </a:stretch>
+        </p:blipFill>
+        <p:spPr>
+          <a:xfrm>
+            <a:off x="2158315" y="1837810"/>
+            <a:ext cx="4366054" cy="2883243"/>
+          </a:xfrm>
+          <a:prstGeom prst="rect">
+            <a:avLst/>
+          </a:prstGeom>
+        </p:spPr>
+      </p:pic>
+      <p:pic>
+        <p:nvPicPr>
+          <p:cNvPr id="8" name="그림 7"/>
+          <p:cNvPicPr>
+            <a:picLocks noChangeAspect="1"/>
+          </p:cNvPicPr>
+          <p:nvPr/>
+        </p:nvPicPr>
+        <p:blipFill>
+          <a:blip r:embed="rId4"/>
+          <a:stretch>
+            <a:fillRect/>
+          </a:stretch>
+        </p:blipFill>
+        <p:spPr>
+          <a:xfrm>
+            <a:off x="2158315" y="1837809"/>
+            <a:ext cx="4366054" cy="2883243"/>
+          </a:xfrm>
+          <a:prstGeom prst="rect">
+            <a:avLst/>
+          </a:prstGeom>
+        </p:spPr>
+      </p:pic>
+      <p:pic>
+        <p:nvPicPr>
+          <p:cNvPr id="9" name="그림 8"/>
+          <p:cNvPicPr>
+            <a:picLocks noChangeAspect="1"/>
+          </p:cNvPicPr>
+          <p:nvPr/>
+        </p:nvPicPr>
+        <p:blipFill>
+          <a:blip r:embed="rId5"/>
+          <a:stretch>
+            <a:fillRect/>
+          </a:stretch>
+        </p:blipFill>
+        <p:spPr>
+          <a:xfrm>
+            <a:off x="2158315" y="1837808"/>
+            <a:ext cx="4375810" cy="2883244"/>
+          </a:xfrm>
+          <a:prstGeom prst="rect">
+            <a:avLst/>
+          </a:prstGeom>
+        </p:spPr>
+      </p:pic>
+      <p:pic>
+        <p:nvPicPr>
+          <p:cNvPr id="10" name="그림 9"/>
+          <p:cNvPicPr>
+            <a:picLocks noChangeAspect="1"/>
+          </p:cNvPicPr>
+          <p:nvPr/>
+        </p:nvPicPr>
+        <p:blipFill>
+          <a:blip r:embed="rId6"/>
+          <a:stretch>
+            <a:fillRect/>
+          </a:stretch>
+        </p:blipFill>
+        <p:spPr>
+          <a:xfrm>
+            <a:off x="2158315" y="1837808"/>
+            <a:ext cx="4360763" cy="2883244"/>
+          </a:xfrm>
+          <a:prstGeom prst="rect">
+            <a:avLst/>
+          </a:prstGeom>
+        </p:spPr>
+      </p:pic>
+    </p:spTree>
+    <p:extLst>
+      <p:ext uri="{BB962C8B-B14F-4D97-AF65-F5344CB8AC3E}">
+        <p14:creationId xmlns:p14="http://schemas.microsoft.com/office/powerpoint/2010/main" val="2963405842"/>
+      </p:ext>
+    </p:extLst>
+  </p:cSld>
+  <p:clrMapOvr>
+    <a:masterClrMapping/>
+  </p:clrMapOvr>
+</p:sld>
+</file>
+
+<file path=ppt/slides/slide4.xml><?xml version="1.0" encoding="utf-8"?>
+<p:sld xmlns:a="http://schemas.openxmlformats.org/drawingml/2006/main" xmlns:r="http://schemas.openxmlformats.org/officeDocument/2006/relationships" xmlns:p="http://schemas.openxmlformats.org/presentationml/2006/main">
+  <p:cSld>
+    <p:spTree>
+      <p:nvGrpSpPr>
+        <p:cNvPr id="1" name=""/>
+        <p:cNvGrpSpPr/>
+        <p:nvPr/>
+      </p:nvGrpSpPr>
+      <p:grpSpPr>
+        <a:xfrm>
+          <a:off x="0" y="0"/>
+          <a:ext cx="0" cy="0"/>
+          <a:chOff x="0" y="0"/>
+          <a:chExt cx="0" cy="0"/>
+        </a:xfrm>
+      </p:grpSpPr>
+      <p:pic>
+        <p:nvPicPr>
+          <p:cNvPr id="1026" name="Picture 2" descr="Image result for monitor png"/>
+          <p:cNvPicPr>
+            <a:picLocks noChangeAspect="1" noChangeArrowheads="1"/>
+          </p:cNvPicPr>
+          <p:nvPr/>
+        </p:nvPicPr>
+        <p:blipFill>
+          <a:blip r:embed="rId2">
+            <a:extLst>
+              <a:ext uri="{28A0092B-C50C-407E-A947-70E740481C1C}">
+                <a14:useLocalDpi xmlns:a14="http://schemas.microsoft.com/office/drawing/2010/main" val="0"/>
+              </a:ext>
+            </a:extLst>
+          </a:blip>
+          <a:srcRect/>
+          <a:stretch>
+            <a:fillRect/>
+          </a:stretch>
+        </p:blipFill>
+        <p:spPr bwMode="auto">
+          <a:xfrm>
+            <a:off x="1959662" y="1612557"/>
+            <a:ext cx="4762500" cy="3333750"/>
+          </a:xfrm>
+          <a:prstGeom prst="rect">
+            <a:avLst/>
+          </a:prstGeom>
+          <a:noFill/>
+          <a:extLst>
+            <a:ext uri="{909E8E84-426E-40DD-AFC4-6F175D3DCCD1}">
+              <a14:hiddenFill xmlns:a14="http://schemas.microsoft.com/office/drawing/2010/main">
+                <a:solidFill>
+                  <a:srgbClr val="FFFFFF"/>
+                </a:solidFill>
+              </a14:hiddenFill>
+            </a:ext>
+          </a:extLst>
+        </p:spPr>
+      </p:pic>
+      <p:pic>
+        <p:nvPicPr>
+          <p:cNvPr id="3" name="그림 2"/>
+          <p:cNvPicPr>
+            <a:picLocks noChangeAspect="1"/>
+          </p:cNvPicPr>
+          <p:nvPr/>
+        </p:nvPicPr>
+        <p:blipFill rotWithShape="1">
+          <a:blip r:embed="rId3" cstate="print">
+            <a:extLst>
+              <a:ext uri="{28A0092B-C50C-407E-A947-70E740481C1C}">
+                <a14:useLocalDpi xmlns:a14="http://schemas.microsoft.com/office/drawing/2010/main" val="0"/>
+              </a:ext>
+            </a:extLst>
+          </a:blip>
+          <a:srcRect t="3114" r="1134" b="1784"/>
+          <a:stretch/>
+        </p:blipFill>
+        <p:spPr>
+          <a:xfrm>
+            <a:off x="2167967" y="1841929"/>
+            <a:ext cx="4356401" cy="2858530"/>
+          </a:xfrm>
+          <a:prstGeom prst="rect">
+            <a:avLst/>
+          </a:prstGeom>
+        </p:spPr>
+      </p:pic>
+      <p:pic>
+        <p:nvPicPr>
+          <p:cNvPr id="5" name="그림 4" descr="교수가입_2.JPG"/>
+          <p:cNvPicPr/>
+          <p:nvPr/>
+        </p:nvPicPr>
+        <p:blipFill rotWithShape="1">
+          <a:blip r:embed="rId4" cstate="print"/>
+          <a:srcRect l="-491" t="3810" r="3067" b="6040"/>
+          <a:stretch/>
+        </p:blipFill>
+        <p:spPr bwMode="auto">
+          <a:xfrm>
+            <a:off x="2166551" y="1841929"/>
+            <a:ext cx="4357817" cy="2858530"/>
+          </a:xfrm>
+          <a:prstGeom prst="rect">
+            <a:avLst/>
+          </a:prstGeom>
+          <a:ln>
+            <a:noFill/>
+          </a:ln>
+          <a:extLst>
+            <a:ext uri="{53640926-AAD7-44D8-BBD7-CCE9431645EC}">
+              <a14:shadowObscured xmlns:a14="http://schemas.microsoft.com/office/drawing/2010/main"/>
+            </a:ext>
+          </a:extLst>
+        </p:spPr>
+      </p:pic>
+      <p:pic>
+        <p:nvPicPr>
+          <p:cNvPr id="6" name="그림 5" descr="나의시간표_18.JPG"/>
+          <p:cNvPicPr/>
+          <p:nvPr/>
+        </p:nvPicPr>
+        <p:blipFill rotWithShape="1">
+          <a:blip r:embed="rId5" cstate="print"/>
+          <a:srcRect t="2984" r="1115" b="5073"/>
+          <a:stretch/>
+        </p:blipFill>
+        <p:spPr bwMode="auto">
+          <a:xfrm>
+            <a:off x="2166551" y="1841929"/>
+            <a:ext cx="4357818" cy="2858530"/>
+          </a:xfrm>
+          <a:prstGeom prst="rect">
+            <a:avLst/>
+          </a:prstGeom>
+          <a:ln>
+            <a:noFill/>
+          </a:ln>
+          <a:extLst>
+            <a:ext uri="{53640926-AAD7-44D8-BBD7-CCE9431645EC}">
+              <a14:shadowObscured xmlns:a14="http://schemas.microsoft.com/office/drawing/2010/main"/>
+            </a:ext>
+          </a:extLst>
+        </p:spPr>
+      </p:pic>
+      <p:pic>
+        <p:nvPicPr>
+          <p:cNvPr id="7" name="그림 6" descr="강의정보_6.JPG"/>
+          <p:cNvPicPr/>
+          <p:nvPr/>
+        </p:nvPicPr>
+        <p:blipFill rotWithShape="1">
+          <a:blip r:embed="rId6" cstate="print"/>
+          <a:srcRect l="680" t="3307" r="1368" b="5727"/>
+          <a:stretch/>
+        </p:blipFill>
+        <p:spPr bwMode="auto">
+          <a:xfrm>
+            <a:off x="2166550" y="1841929"/>
+            <a:ext cx="4357818" cy="2858530"/>
+          </a:xfrm>
+          <a:prstGeom prst="rect">
+            <a:avLst/>
+          </a:prstGeom>
+          <a:ln>
+            <a:noFill/>
+          </a:ln>
+          <a:extLst>
+            <a:ext uri="{53640926-AAD7-44D8-BBD7-CCE9431645EC}">
+              <a14:shadowObscured xmlns:a14="http://schemas.microsoft.com/office/drawing/2010/main"/>
+            </a:ext>
+          </a:extLst>
+        </p:spPr>
+      </p:pic>
+      <p:pic>
+        <p:nvPicPr>
+          <p:cNvPr id="8" name="그림 7" descr="강의정보_7.JPG"/>
+          <p:cNvPicPr/>
+          <p:nvPr/>
+        </p:nvPicPr>
+        <p:blipFill rotWithShape="1">
+          <a:blip r:embed="rId7" cstate="print"/>
+          <a:srcRect t="3095" r="1701" b="5831"/>
+          <a:stretch/>
+        </p:blipFill>
+        <p:spPr bwMode="auto">
+          <a:xfrm>
+            <a:off x="2166550" y="1841929"/>
+            <a:ext cx="4357818" cy="2858530"/>
+          </a:xfrm>
+          <a:prstGeom prst="rect">
+            <a:avLst/>
+          </a:prstGeom>
+          <a:ln>
+            <a:noFill/>
+          </a:ln>
+          <a:extLst>
+            <a:ext uri="{53640926-AAD7-44D8-BBD7-CCE9431645EC}">
+              <a14:shadowObscured xmlns:a14="http://schemas.microsoft.com/office/drawing/2010/main"/>
+            </a:ext>
+          </a:extLst>
+        </p:spPr>
+      </p:pic>
+    </p:spTree>
+    <p:extLst>
+      <p:ext uri="{BB962C8B-B14F-4D97-AF65-F5344CB8AC3E}">
+        <p14:creationId xmlns:p14="http://schemas.microsoft.com/office/powerpoint/2010/main" val="366233971"/>
+      </p:ext>
+    </p:extLst>
+  </p:cSld>
+  <p:clrMapOvr>
+    <a:masterClrMapping/>
+  </p:clrMapOvr>
+</p:sld>
+</file>
+
+<file path=ppt/slides/slide5.xml><?xml version="1.0" encoding="utf-8"?>
+<p:sld xmlns:a="http://schemas.openxmlformats.org/drawingml/2006/main" xmlns:r="http://schemas.openxmlformats.org/officeDocument/2006/relationships" xmlns:p="http://schemas.openxmlformats.org/presentationml/2006/main">
+  <p:cSld>
+    <p:spTree>
+      <p:nvGrpSpPr>
+        <p:cNvPr id="1" name=""/>
+        <p:cNvGrpSpPr/>
+        <p:nvPr/>
+      </p:nvGrpSpPr>
+      <p:grpSpPr>
+        <a:xfrm>
+          <a:off x="0" y="0"/>
+          <a:ext cx="0" cy="0"/>
+          <a:chOff x="0" y="0"/>
+          <a:chExt cx="0" cy="0"/>
+        </a:xfrm>
+      </p:grpSpPr>
+      <p:pic>
+        <p:nvPicPr>
+          <p:cNvPr id="1026" name="Picture 2" descr="Image result for monitor png"/>
+          <p:cNvPicPr>
+            <a:picLocks noChangeAspect="1" noChangeArrowheads="1"/>
+          </p:cNvPicPr>
+          <p:nvPr/>
+        </p:nvPicPr>
+        <p:blipFill>
+          <a:blip r:embed="rId2">
+            <a:extLst>
+              <a:ext uri="{28A0092B-C50C-407E-A947-70E740481C1C}">
+                <a14:useLocalDpi xmlns:a14="http://schemas.microsoft.com/office/drawing/2010/main" val="0"/>
+              </a:ext>
+            </a:extLst>
+          </a:blip>
+          <a:srcRect/>
+          <a:stretch>
+            <a:fillRect/>
+          </a:stretch>
+        </p:blipFill>
+        <p:spPr bwMode="auto">
+          <a:xfrm>
+            <a:off x="1959662" y="1612557"/>
+            <a:ext cx="4762500" cy="3333750"/>
+          </a:xfrm>
+          <a:prstGeom prst="rect">
+            <a:avLst/>
+          </a:prstGeom>
+          <a:noFill/>
+          <a:extLst>
+            <a:ext uri="{909E8E84-426E-40DD-AFC4-6F175D3DCCD1}">
+              <a14:hiddenFill xmlns:a14="http://schemas.microsoft.com/office/drawing/2010/main">
+                <a:solidFill>
+                  <a:srgbClr val="FFFFFF"/>
+                </a:solidFill>
+              </a14:hiddenFill>
+            </a:ext>
+          </a:extLst>
+        </p:spPr>
+      </p:pic>
+      <p:pic>
+        <p:nvPicPr>
+          <p:cNvPr id="3" name="그림 2"/>
+          <p:cNvPicPr>
+            <a:picLocks noChangeAspect="1"/>
+          </p:cNvPicPr>
+          <p:nvPr/>
+        </p:nvPicPr>
+        <p:blipFill>
+          <a:blip r:embed="rId3" cstate="print">
+            <a:extLst>
+              <a:ext uri="{28A0092B-C50C-407E-A947-70E740481C1C}">
+                <a14:useLocalDpi xmlns:a14="http://schemas.microsoft.com/office/drawing/2010/main" val="0"/>
+              </a:ext>
+            </a:extLst>
+          </a:blip>
+          <a:stretch>
+            <a:fillRect/>
+          </a:stretch>
+        </p:blipFill>
+        <p:spPr>
+          <a:xfrm>
+            <a:off x="2158314" y="1812692"/>
+            <a:ext cx="4382529" cy="2907589"/>
+          </a:xfrm>
+          <a:prstGeom prst="rect">
+            <a:avLst/>
+          </a:prstGeom>
+        </p:spPr>
+      </p:pic>
+    </p:spTree>
+    <p:extLst>
+      <p:ext uri="{BB962C8B-B14F-4D97-AF65-F5344CB8AC3E}">
+        <p14:creationId xmlns:p14="http://schemas.microsoft.com/office/powerpoint/2010/main" val="2419467144"/>
+      </p:ext>
+    </p:extLst>
+  </p:cSld>
+  <p:clrMapOvr>
+    <a:masterClrMapping/>
+  </p:clrMapOvr>
+</p:sld>
+</file>
+
+<file path=ppt/slides/slide6.xml><?xml version="1.0" encoding="utf-8"?>
+<p:sld xmlns:a="http://schemas.openxmlformats.org/drawingml/2006/main" xmlns:r="http://schemas.openxmlformats.org/officeDocument/2006/relationships" xmlns:p="http://schemas.openxmlformats.org/presentationml/2006/main">
+  <p:cSld>
+    <p:spTree>
+      <p:nvGrpSpPr>
+        <p:cNvPr id="1" name=""/>
+        <p:cNvGrpSpPr/>
+        <p:nvPr/>
+      </p:nvGrpSpPr>
+      <p:grpSpPr>
+        <a:xfrm>
+          <a:off x="0" y="0"/>
+          <a:ext cx="0" cy="0"/>
+          <a:chOff x="0" y="0"/>
+          <a:chExt cx="0" cy="0"/>
+        </a:xfrm>
+      </p:grpSpPr>
+      <p:pic>
+        <p:nvPicPr>
+          <p:cNvPr id="1026" name="Picture 2" descr="Image result for monitor png"/>
+          <p:cNvPicPr>
+            <a:picLocks noChangeAspect="1" noChangeArrowheads="1"/>
+          </p:cNvPicPr>
+          <p:nvPr/>
+        </p:nvPicPr>
+        <p:blipFill>
+          <a:blip r:embed="rId2">
+            <a:extLst>
+              <a:ext uri="{28A0092B-C50C-407E-A947-70E740481C1C}">
+                <a14:useLocalDpi xmlns:a14="http://schemas.microsoft.com/office/drawing/2010/main" val="0"/>
+              </a:ext>
+            </a:extLst>
+          </a:blip>
+          <a:srcRect/>
+          <a:stretch>
+            <a:fillRect/>
+          </a:stretch>
+        </p:blipFill>
+        <p:spPr bwMode="auto">
+          <a:xfrm>
+            <a:off x="1959662" y="1612557"/>
+            <a:ext cx="4762500" cy="3333750"/>
+          </a:xfrm>
+          <a:prstGeom prst="rect">
+            <a:avLst/>
+          </a:prstGeom>
+          <a:noFill/>
+          <a:extLst>
+            <a:ext uri="{909E8E84-426E-40DD-AFC4-6F175D3DCCD1}">
+              <a14:hiddenFill xmlns:a14="http://schemas.microsoft.com/office/drawing/2010/main">
+                <a:solidFill>
+                  <a:srgbClr val="FFFFFF"/>
+                </a:solidFill>
+              </a14:hiddenFill>
+            </a:ext>
+          </a:extLst>
+        </p:spPr>
+      </p:pic>
+      <p:pic>
+        <p:nvPicPr>
+          <p:cNvPr id="3" name="그림 2"/>
+          <p:cNvPicPr/>
+          <p:nvPr/>
+        </p:nvPicPr>
+        <p:blipFill rotWithShape="1">
+          <a:blip r:embed="rId3"/>
+          <a:srcRect l="14762" r="13274"/>
+          <a:stretch/>
+        </p:blipFill>
+        <p:spPr>
+          <a:xfrm>
+            <a:off x="2185472" y="1861751"/>
+            <a:ext cx="4322419" cy="2817341"/>
+          </a:xfrm>
+          <a:prstGeom prst="rect">
+            <a:avLst/>
+          </a:prstGeom>
+          <a:ln w="28575">
+            <a:solidFill>
+              <a:srgbClr val="31859C"/>
+            </a:solidFill>
+          </a:ln>
+        </p:spPr>
+      </p:pic>
+      <p:pic>
+        <p:nvPicPr>
+          <p:cNvPr id="4" name="그림 3"/>
+          <p:cNvPicPr/>
+          <p:nvPr/>
+        </p:nvPicPr>
+        <p:blipFill rotWithShape="1">
+          <a:blip r:embed="rId4"/>
+          <a:srcRect l="14199" r="15522"/>
+          <a:stretch/>
+        </p:blipFill>
+        <p:spPr>
+          <a:xfrm>
+            <a:off x="6273907" y="1870761"/>
+            <a:ext cx="4322419" cy="2817342"/>
+          </a:xfrm>
+          <a:prstGeom prst="rect">
+            <a:avLst/>
+          </a:prstGeom>
+          <a:ln w="28575">
+            <a:solidFill>
+              <a:srgbClr val="31859C"/>
+            </a:solidFill>
+          </a:ln>
+        </p:spPr>
+      </p:pic>
+    </p:spTree>
+    <p:extLst>
+      <p:ext uri="{BB962C8B-B14F-4D97-AF65-F5344CB8AC3E}">
+        <p14:creationId xmlns:p14="http://schemas.microsoft.com/office/powerpoint/2010/main" val="827584920"/>
+      </p:ext>
+    </p:extLst>
+  </p:cSld>
+  <p:clrMapOvr>
+    <a:masterClrMapping/>
+  </p:clrMapOvr>
+</p:sld>
+</file>
+
 <file path=ppt/theme/theme1.xml><?xml version="1.0" encoding="utf-8"?>
 <a:theme xmlns:a="http://schemas.openxmlformats.org/drawingml/2006/main" name="Office Theme">
   <a:themeElements>

</xml_diff>